<commit_message>
alterações  da apresentação da parte 3
</commit_message>
<xml_diff>
--- a/parte3/Treinamento 2 - JavaScript - Parte 3 (Revisado 23.10.2017).pptx
+++ b/parte3/Treinamento 2 - JavaScript - Parte 3 (Revisado 23.10.2017).pptx
@@ -204,7 +204,7 @@
           <a:p>
             <a:fld id="{9B6BF049-9374-4F1D-9012-2492B7F95F04}" type="datetimeFigureOut">
               <a:rPr lang="pt-BR" smtClean="0"/>
-              <a:t>29/01/2018</a:t>
+              <a:t>30/01/2018</a:t>
             </a:fld>
             <a:endParaRPr lang="pt-BR"/>
           </a:p>
@@ -954,7 +954,7 @@
           <a:p>
             <a:fld id="{744CA574-0275-4727-8E86-D431B89400F6}" type="datetime1">
               <a:rPr lang="pt-BR" smtClean="0"/>
-              <a:t>29/01/2018</a:t>
+              <a:t>30/01/2018</a:t>
             </a:fld>
             <a:endParaRPr lang="pt-BR"/>
           </a:p>
@@ -1127,7 +1127,7 @@
           <a:p>
             <a:fld id="{EA9BB5FB-3271-4F9A-A1B1-C31985B5A00D}" type="datetime1">
               <a:rPr lang="pt-BR" smtClean="0"/>
-              <a:t>29/01/2018</a:t>
+              <a:t>30/01/2018</a:t>
             </a:fld>
             <a:endParaRPr lang="pt-BR"/>
           </a:p>
@@ -1402,7 +1402,7 @@
           <a:p>
             <a:fld id="{1D27497E-89E0-4457-9D50-B71CC669FCFC}" type="datetime1">
               <a:rPr lang="pt-BR" smtClean="0"/>
-              <a:t>29/01/2018</a:t>
+              <a:t>30/01/2018</a:t>
             </a:fld>
             <a:endParaRPr lang="pt-BR"/>
           </a:p>
@@ -1654,7 +1654,7 @@
           <a:p>
             <a:fld id="{2E6E8A51-9577-4D92-96AA-BE8BFE6948C5}" type="datetime1">
               <a:rPr lang="pt-BR" smtClean="0"/>
-              <a:t>29/01/2018</a:t>
+              <a:t>30/01/2018</a:t>
             </a:fld>
             <a:endParaRPr lang="pt-BR"/>
           </a:p>
@@ -1848,7 +1848,7 @@
           <a:p>
             <a:fld id="{A1B92794-AE9E-4DA1-AD30-EFFC9163F2B3}" type="datetime1">
               <a:rPr lang="pt-BR" smtClean="0"/>
-              <a:t>29/01/2018</a:t>
+              <a:t>30/01/2018</a:t>
             </a:fld>
             <a:endParaRPr lang="en-US" dirty="0"/>
           </a:p>
@@ -2146,7 +2146,7 @@
           <a:p>
             <a:fld id="{A1D1A6C1-AE08-401D-9AF1-7DBFAAC75FEA}" type="datetime1">
               <a:rPr lang="pt-BR" smtClean="0"/>
-              <a:t>29/01/2018</a:t>
+              <a:t>30/01/2018</a:t>
             </a:fld>
             <a:endParaRPr lang="pt-BR"/>
           </a:p>
@@ -2487,7 +2487,7 @@
           <a:p>
             <a:fld id="{C88F16AB-E7F3-4DF6-9BFF-79044FC97346}" type="datetime1">
               <a:rPr lang="pt-BR" smtClean="0"/>
-              <a:t>29/01/2018</a:t>
+              <a:t>30/01/2018</a:t>
             </a:fld>
             <a:endParaRPr lang="pt-BR"/>
           </a:p>
@@ -3065,7 +3065,7 @@
           <a:p>
             <a:fld id="{158E9144-6818-4837-93DC-BD8DC9AD81B3}" type="datetime1">
               <a:rPr lang="pt-BR" smtClean="0"/>
-              <a:t>29/01/2018</a:t>
+              <a:t>30/01/2018</a:t>
             </a:fld>
             <a:endParaRPr lang="pt-BR"/>
           </a:p>
@@ -3427,7 +3427,7 @@
           <a:p>
             <a:fld id="{32BA1D34-CC38-4D8C-AFD3-6F0CC5C1997C}" type="datetime1">
               <a:rPr lang="pt-BR" smtClean="0"/>
-              <a:t>29/01/2018</a:t>
+              <a:t>30/01/2018</a:t>
             </a:fld>
             <a:endParaRPr lang="pt-BR"/>
           </a:p>
@@ -3742,7 +3742,7 @@
           <a:p>
             <a:fld id="{6E5CEDC8-2664-42FF-A9D9-DDD6FF5CFEBF}" type="datetime1">
               <a:rPr lang="pt-BR" smtClean="0"/>
-              <a:t>29/01/2018</a:t>
+              <a:t>30/01/2018</a:t>
             </a:fld>
             <a:endParaRPr lang="pt-BR"/>
           </a:p>
@@ -4200,7 +4200,7 @@
           <a:p>
             <a:fld id="{A4E218A1-A94F-44A9-BECC-EE5EDB2D8A12}" type="datetime1">
               <a:rPr lang="pt-BR" smtClean="0"/>
-              <a:t>29/01/2018</a:t>
+              <a:t>30/01/2018</a:t>
             </a:fld>
             <a:endParaRPr lang="pt-BR"/>
           </a:p>
@@ -4363,7 +4363,7 @@
           <a:p>
             <a:fld id="{5A7797BF-B59B-42D7-BC31-2EFC97353070}" type="datetime1">
               <a:rPr lang="pt-BR" smtClean="0"/>
-              <a:t>29/01/2018</a:t>
+              <a:t>30/01/2018</a:t>
             </a:fld>
             <a:endParaRPr lang="pt-BR"/>
           </a:p>
@@ -4574,7 +4574,7 @@
           <a:p>
             <a:fld id="{45899652-41B9-4498-A817-021740982A94}" type="datetime1">
               <a:rPr lang="pt-BR" smtClean="0"/>
-              <a:t>29/01/2018</a:t>
+              <a:t>30/01/2018</a:t>
             </a:fld>
             <a:endParaRPr lang="pt-BR"/>
           </a:p>
@@ -5293,7 +5293,7 @@
           </a:p>
           <a:p>
             <a:r>
-              <a:rPr lang="pt-BR" smtClean="0"/>
+              <a:rPr lang="pt-BR" dirty="0" err="1" smtClean="0"/>
               <a:t>Lodash</a:t>
             </a:r>
             <a:endParaRPr lang="pt-BR" dirty="0"/>

</xml_diff>